<commit_message>
Update 7-IBFE-Two Boundaries - Flapping wings and beam hits circle.pptx
additional slide
</commit_message>
<xml_diff>
--- a/IBFE Lectures/7-IBFE-Two Boundaries - Flapping wings and beam hits circle.pptx
+++ b/IBFE Lectures/7-IBFE-Two Boundaries - Flapping wings and beam hits circle.pptx
@@ -5,7 +5,7 @@
     <p:sldMasterId id="2147483648" r:id="rId1"/>
   </p:sldMasterIdLst>
   <p:notesMasterIdLst>
-    <p:notesMasterId r:id="rId21"/>
+    <p:notesMasterId r:id="rId22"/>
   </p:notesMasterIdLst>
   <p:sldIdLst>
     <p:sldId id="269" r:id="rId2"/>
@@ -23,10 +23,11 @@
     <p:sldId id="267" r:id="rId14"/>
     <p:sldId id="265" r:id="rId15"/>
     <p:sldId id="268" r:id="rId16"/>
-    <p:sldId id="272" r:id="rId17"/>
-    <p:sldId id="271" r:id="rId18"/>
-    <p:sldId id="273" r:id="rId19"/>
-    <p:sldId id="274" r:id="rId20"/>
+    <p:sldId id="275" r:id="rId17"/>
+    <p:sldId id="272" r:id="rId18"/>
+    <p:sldId id="271" r:id="rId19"/>
+    <p:sldId id="273" r:id="rId20"/>
+    <p:sldId id="274" r:id="rId21"/>
   </p:sldIdLst>
   <p:sldSz cx="12192000" cy="6858000"/>
   <p:notesSz cx="6858000" cy="9144000"/>
@@ -723,7 +724,7 @@
           <a:p>
             <a:fld id="{1BEC8BFE-537E-441E-9571-C55B631BDD52}" type="datetimeFigureOut">
               <a:rPr lang="en-US" smtClean="0"/>
-              <a:t>8/4/2020</a:t>
+              <a:t>8/6/2020</a:t>
             </a:fld>
             <a:endParaRPr lang="en-US"/>
           </a:p>
@@ -893,7 +894,7 @@
           <a:p>
             <a:fld id="{1BEC8BFE-537E-441E-9571-C55B631BDD52}" type="datetimeFigureOut">
               <a:rPr lang="en-US" smtClean="0"/>
-              <a:t>8/4/2020</a:t>
+              <a:t>8/6/2020</a:t>
             </a:fld>
             <a:endParaRPr lang="en-US"/>
           </a:p>
@@ -1073,7 +1074,7 @@
           <a:p>
             <a:fld id="{1BEC8BFE-537E-441E-9571-C55B631BDD52}" type="datetimeFigureOut">
               <a:rPr lang="en-US" smtClean="0"/>
-              <a:t>8/4/2020</a:t>
+              <a:t>8/6/2020</a:t>
             </a:fld>
             <a:endParaRPr lang="en-US"/>
           </a:p>
@@ -1602,7 +1603,7 @@
           <a:p>
             <a:fld id="{1BEC8BFE-537E-441E-9571-C55B631BDD52}" type="datetimeFigureOut">
               <a:rPr lang="en-US" smtClean="0"/>
-              <a:t>8/4/2020</a:t>
+              <a:t>8/6/2020</a:t>
             </a:fld>
             <a:endParaRPr lang="en-US"/>
           </a:p>
@@ -1848,7 +1849,7 @@
           <a:p>
             <a:fld id="{1BEC8BFE-537E-441E-9571-C55B631BDD52}" type="datetimeFigureOut">
               <a:rPr lang="en-US" smtClean="0"/>
-              <a:t>8/4/2020</a:t>
+              <a:t>8/6/2020</a:t>
             </a:fld>
             <a:endParaRPr lang="en-US"/>
           </a:p>
@@ -2080,7 +2081,7 @@
           <a:p>
             <a:fld id="{1BEC8BFE-537E-441E-9571-C55B631BDD52}" type="datetimeFigureOut">
               <a:rPr lang="en-US" smtClean="0"/>
-              <a:t>8/4/2020</a:t>
+              <a:t>8/6/2020</a:t>
             </a:fld>
             <a:endParaRPr lang="en-US"/>
           </a:p>
@@ -2447,7 +2448,7 @@
           <a:p>
             <a:fld id="{1BEC8BFE-537E-441E-9571-C55B631BDD52}" type="datetimeFigureOut">
               <a:rPr lang="en-US" smtClean="0"/>
-              <a:t>8/4/2020</a:t>
+              <a:t>8/6/2020</a:t>
             </a:fld>
             <a:endParaRPr lang="en-US"/>
           </a:p>
@@ -2565,7 +2566,7 @@
           <a:p>
             <a:fld id="{1BEC8BFE-537E-441E-9571-C55B631BDD52}" type="datetimeFigureOut">
               <a:rPr lang="en-US" smtClean="0"/>
-              <a:t>8/4/2020</a:t>
+              <a:t>8/6/2020</a:t>
             </a:fld>
             <a:endParaRPr lang="en-US"/>
           </a:p>
@@ -2660,7 +2661,7 @@
           <a:p>
             <a:fld id="{1BEC8BFE-537E-441E-9571-C55B631BDD52}" type="datetimeFigureOut">
               <a:rPr lang="en-US" smtClean="0"/>
-              <a:t>8/4/2020</a:t>
+              <a:t>8/6/2020</a:t>
             </a:fld>
             <a:endParaRPr lang="en-US"/>
           </a:p>
@@ -2937,7 +2938,7 @@
           <a:p>
             <a:fld id="{1BEC8BFE-537E-441E-9571-C55B631BDD52}" type="datetimeFigureOut">
               <a:rPr lang="en-US" smtClean="0"/>
-              <a:t>8/4/2020</a:t>
+              <a:t>8/6/2020</a:t>
             </a:fld>
             <a:endParaRPr lang="en-US"/>
           </a:p>
@@ -3190,7 +3191,7 @@
           <a:p>
             <a:fld id="{1BEC8BFE-537E-441E-9571-C55B631BDD52}" type="datetimeFigureOut">
               <a:rPr lang="en-US" smtClean="0"/>
-              <a:t>8/4/2020</a:t>
+              <a:t>8/6/2020</a:t>
             </a:fld>
             <a:endParaRPr lang="en-US"/>
           </a:p>
@@ -3403,7 +3404,7 @@
           <a:p>
             <a:fld id="{1BEC8BFE-537E-441E-9571-C55B631BDD52}" type="datetimeFigureOut">
               <a:rPr lang="en-US" smtClean="0"/>
-              <a:t>8/4/2020</a:t>
+              <a:t>8/6/2020</a:t>
             </a:fld>
             <a:endParaRPr lang="en-US"/>
           </a:p>
@@ -4757,7 +4758,6 @@
               <a:rPr lang="en-US" dirty="0"/>
               <a:t>] = &amp;mesh2;</a:t>
             </a:r>
-            <a:endParaRPr lang="en-US" dirty="0"/>
           </a:p>
         </p:txBody>
       </p:sp>
@@ -6133,6 +6133,196 @@
             <p:ph type="title"/>
           </p:nvPr>
         </p:nvSpPr>
+        <p:spPr/>
+        <p:txBody>
+          <a:bodyPr/>
+          <a:lstStyle/>
+          <a:p>
+            <a:r>
+              <a:rPr lang="en-US" dirty="0" smtClean="0"/>
+              <a:t>Making the boundaries in Trellis</a:t>
+            </a:r>
+            <a:endParaRPr lang="en-US" dirty="0"/>
+          </a:p>
+        </p:txBody>
+      </p:sp>
+      <p:sp>
+        <p:nvSpPr>
+          <p:cNvPr id="3" name="Content Placeholder 2"/>
+          <p:cNvSpPr>
+            <a:spLocks noGrp="1"/>
+          </p:cNvSpPr>
+          <p:nvPr>
+            <p:ph idx="1"/>
+          </p:nvPr>
+        </p:nvSpPr>
+        <p:spPr/>
+        <p:txBody>
+          <a:bodyPr/>
+          <a:lstStyle/>
+          <a:p>
+            <a:r>
+              <a:rPr lang="en-US" dirty="0" smtClean="0"/>
+              <a:t>You have to do a little extra work to make a 2D boundary in Trellis, which can be done through the GUI with some tinkering….</a:t>
+            </a:r>
+            <a:endParaRPr lang="en-US" dirty="0"/>
+          </a:p>
+        </p:txBody>
+      </p:sp>
+      <p:sp>
+        <p:nvSpPr>
+          <p:cNvPr id="4" name="Rectangle 3"/>
+          <p:cNvSpPr/>
+          <p:nvPr/>
+        </p:nvSpPr>
+        <p:spPr>
+          <a:xfrm>
+            <a:off x="1235243" y="2749132"/>
+            <a:ext cx="9127958" cy="3139321"/>
+          </a:xfrm>
+          <a:prstGeom prst="rect">
+            <a:avLst/>
+          </a:prstGeom>
+        </p:spPr>
+        <p:txBody>
+          <a:bodyPr wrap="square">
+            <a:spAutoFit/>
+          </a:bodyPr>
+          <a:lstStyle/>
+          <a:p>
+            <a:r>
+              <a:rPr lang="en-US" dirty="0" err="1">
+                <a:solidFill>
+                  <a:srgbClr val="0070C0"/>
+                </a:solidFill>
+                <a:latin typeface="Calibri" panose="020F0502020204030204" pitchFamily="34" charset="0"/>
+                <a:ea typeface="Times New Roman" panose="02020603050405020304" pitchFamily="18" charset="0"/>
+              </a:rPr>
+              <a:t>Trelis</a:t>
+            </a:r>
+            <a:r>
+              <a:rPr lang="en-US" dirty="0">
+                <a:solidFill>
+                  <a:srgbClr val="0070C0"/>
+                </a:solidFill>
+                <a:latin typeface="Calibri" panose="020F0502020204030204" pitchFamily="34" charset="0"/>
+                <a:ea typeface="Times New Roman" panose="02020603050405020304" pitchFamily="18" charset="0"/>
+              </a:rPr>
+              <a:t> also provides the capability of writing two-dimensional Genesis databases similar to FASTQ. The user must first assign the appropriate surfaces in the model to an element block. Then a Quad* type element may be specified for the element block. For example</a:t>
+            </a:r>
+          </a:p>
+          <a:p>
+            <a:r>
+              <a:rPr lang="en-US" b="1" dirty="0">
+                <a:solidFill>
+                  <a:srgbClr val="0070C0"/>
+                </a:solidFill>
+                <a:latin typeface="Calibri" panose="020F0502020204030204" pitchFamily="34" charset="0"/>
+                <a:ea typeface="Times New Roman" panose="02020603050405020304" pitchFamily="18" charset="0"/>
+              </a:rPr>
+              <a:t>Block 1 Surface 1 To 4</a:t>
+            </a:r>
+            <a:br>
+              <a:rPr lang="en-US" b="1" dirty="0">
+                <a:solidFill>
+                  <a:srgbClr val="0070C0"/>
+                </a:solidFill>
+                <a:latin typeface="Calibri" panose="020F0502020204030204" pitchFamily="34" charset="0"/>
+                <a:ea typeface="Times New Roman" panose="02020603050405020304" pitchFamily="18" charset="0"/>
+              </a:rPr>
+            </a:br>
+            <a:r>
+              <a:rPr lang="en-US" b="1" dirty="0">
+                <a:solidFill>
+                  <a:srgbClr val="0070C0"/>
+                </a:solidFill>
+                <a:latin typeface="Calibri" panose="020F0502020204030204" pitchFamily="34" charset="0"/>
+                <a:ea typeface="Times New Roman" panose="02020603050405020304" pitchFamily="18" charset="0"/>
+              </a:rPr>
+              <a:t>Block 1 Element Type Quad4</a:t>
+            </a:r>
+            <a:endParaRPr lang="en-US" dirty="0">
+              <a:solidFill>
+                <a:srgbClr val="0070C0"/>
+              </a:solidFill>
+              <a:latin typeface="Calibri" panose="020F0502020204030204" pitchFamily="34" charset="0"/>
+              <a:ea typeface="Times New Roman" panose="02020603050405020304" pitchFamily="18" charset="0"/>
+            </a:endParaRPr>
+          </a:p>
+          <a:p>
+            <a:r>
+              <a:rPr lang="en-US" dirty="0">
+                <a:solidFill>
+                  <a:srgbClr val="0070C0"/>
+                </a:solidFill>
+                <a:latin typeface="Calibri" panose="020F0502020204030204" pitchFamily="34" charset="0"/>
+                <a:ea typeface="Times New Roman" panose="02020603050405020304" pitchFamily="18" charset="0"/>
+              </a:rPr>
+              <a:t>In this case, it is important for users to note that a two-dimensional Genesis database will result. In writing a two-dimensional Genesis database, </a:t>
+            </a:r>
+            <a:r>
+              <a:rPr lang="en-US" dirty="0" err="1">
+                <a:solidFill>
+                  <a:srgbClr val="0070C0"/>
+                </a:solidFill>
+                <a:latin typeface="Calibri" panose="020F0502020204030204" pitchFamily="34" charset="0"/>
+                <a:ea typeface="Times New Roman" panose="02020603050405020304" pitchFamily="18" charset="0"/>
+              </a:rPr>
+              <a:t>Trelis</a:t>
+            </a:r>
+            <a:r>
+              <a:rPr lang="en-US" dirty="0">
+                <a:solidFill>
+                  <a:srgbClr val="0070C0"/>
+                </a:solidFill>
+                <a:latin typeface="Calibri" panose="020F0502020204030204" pitchFamily="34" charset="0"/>
+                <a:ea typeface="Times New Roman" panose="02020603050405020304" pitchFamily="18" charset="0"/>
+              </a:rPr>
+              <a:t> ignores all z-coordinate data. Therefore, the user must ensure that the Element Block is assigned to a planar surface lying in a plane parallel to the x-y plane. Currently, the Quad* element types are the only supported two-dimensional elements. Two-dimensional shell elements will be added in the near future if required.</a:t>
+            </a:r>
+          </a:p>
+        </p:txBody>
+      </p:sp>
+    </p:spTree>
+    <p:extLst>
+      <p:ext uri="{BB962C8B-B14F-4D97-AF65-F5344CB8AC3E}">
+        <p14:creationId xmlns:p14="http://schemas.microsoft.com/office/powerpoint/2010/main" val="3643338029"/>
+      </p:ext>
+    </p:extLst>
+  </p:cSld>
+  <p:clrMapOvr>
+    <a:masterClrMapping/>
+  </p:clrMapOvr>
+</p:sld>
+</file>
+
+<file path=ppt/slides/slide17.xml><?xml version="1.0" encoding="utf-8"?>
+<p:sld xmlns:a="http://schemas.openxmlformats.org/drawingml/2006/main" xmlns:r="http://schemas.openxmlformats.org/officeDocument/2006/relationships" xmlns:p="http://schemas.openxmlformats.org/presentationml/2006/main">
+  <p:cSld>
+    <p:spTree>
+      <p:nvGrpSpPr>
+        <p:cNvPr id="1" name=""/>
+        <p:cNvGrpSpPr/>
+        <p:nvPr/>
+      </p:nvGrpSpPr>
+      <p:grpSpPr>
+        <a:xfrm>
+          <a:off x="0" y="0"/>
+          <a:ext cx="0" cy="0"/>
+          <a:chOff x="0" y="0"/>
+          <a:chExt cx="0" cy="0"/>
+        </a:xfrm>
+      </p:grpSpPr>
+      <p:sp>
+        <p:nvSpPr>
+          <p:cNvPr id="2" name="Title 1"/>
+          <p:cNvSpPr>
+            <a:spLocks noGrp="1"/>
+          </p:cNvSpPr>
+          <p:nvPr>
+            <p:ph type="title"/>
+          </p:nvPr>
+        </p:nvSpPr>
         <p:spPr>
           <a:xfrm>
             <a:off x="838200" y="156579"/>
@@ -6667,7 +6857,7 @@
 </p:sld>
 </file>
 
-<file path=ppt/slides/slide17.xml><?xml version="1.0" encoding="utf-8"?>
+<file path=ppt/slides/slide18.xml><?xml version="1.0" encoding="utf-8"?>
 <p:sld xmlns:a="http://schemas.openxmlformats.org/drawingml/2006/main" xmlns:r="http://schemas.openxmlformats.org/officeDocument/2006/relationships" xmlns:p="http://schemas.openxmlformats.org/presentationml/2006/main">
   <p:cSld>
     <p:spTree>
@@ -7397,408 +7587,6 @@
 </p:sld>
 </file>
 
-<file path=ppt/slides/slide18.xml><?xml version="1.0" encoding="utf-8"?>
-<p:sld xmlns:a="http://schemas.openxmlformats.org/drawingml/2006/main" xmlns:r="http://schemas.openxmlformats.org/officeDocument/2006/relationships" xmlns:p="http://schemas.openxmlformats.org/presentationml/2006/main">
-  <p:cSld>
-    <p:spTree>
-      <p:nvGrpSpPr>
-        <p:cNvPr id="1" name=""/>
-        <p:cNvGrpSpPr/>
-        <p:nvPr/>
-      </p:nvGrpSpPr>
-      <p:grpSpPr>
-        <a:xfrm>
-          <a:off x="0" y="0"/>
-          <a:ext cx="0" cy="0"/>
-          <a:chOff x="0" y="0"/>
-          <a:chExt cx="0" cy="0"/>
-        </a:xfrm>
-      </p:grpSpPr>
-      <p:sp>
-        <p:nvSpPr>
-          <p:cNvPr id="2" name="Title 1"/>
-          <p:cNvSpPr>
-            <a:spLocks noGrp="1"/>
-          </p:cNvSpPr>
-          <p:nvPr>
-            <p:ph type="title"/>
-          </p:nvPr>
-        </p:nvSpPr>
-        <p:spPr>
-          <a:xfrm>
-            <a:off x="774032" y="284915"/>
-            <a:ext cx="10515600" cy="1325563"/>
-          </a:xfrm>
-        </p:spPr>
-        <p:txBody>
-          <a:bodyPr/>
-          <a:lstStyle/>
-          <a:p>
-            <a:r>
-              <a:rPr lang="en" b="1" dirty="0"/>
-              <a:t>Relevant lines in main.C</a:t>
-            </a:r>
-            <a:endParaRPr lang="en-US" dirty="0"/>
-          </a:p>
-        </p:txBody>
-      </p:sp>
-      <p:sp>
-        <p:nvSpPr>
-          <p:cNvPr id="4" name="Rectangle 3"/>
-          <p:cNvSpPr/>
-          <p:nvPr/>
-        </p:nvSpPr>
-        <p:spPr>
-          <a:xfrm>
-            <a:off x="774032" y="1491384"/>
-            <a:ext cx="10904621" cy="5062924"/>
-          </a:xfrm>
-          <a:prstGeom prst="rect">
-            <a:avLst/>
-          </a:prstGeom>
-        </p:spPr>
-        <p:txBody>
-          <a:bodyPr wrap="square">
-            <a:spAutoFit/>
-          </a:bodyPr>
-          <a:lstStyle/>
-          <a:p>
-            <a:r>
-              <a:rPr lang="en-US" sz="1700" dirty="0"/>
-              <a:t> // Configure the IBFE solver.	</a:t>
-            </a:r>
-            <a:endParaRPr lang="en-US" sz="1700" dirty="0" smtClean="0"/>
-          </a:p>
-          <a:p>
-            <a:r>
-              <a:rPr lang="en-US" sz="1700" dirty="0" err="1" smtClean="0"/>
-              <a:t>ib_method_ops</a:t>
-            </a:r>
-            <a:r>
-              <a:rPr lang="en-US" sz="1700" dirty="0" smtClean="0"/>
-              <a:t>-</a:t>
-            </a:r>
-            <a:r>
-              <a:rPr lang="en-US" sz="1700" dirty="0"/>
-              <a:t>&gt;</a:t>
-            </a:r>
-            <a:r>
-              <a:rPr lang="en-US" sz="1700" dirty="0" err="1"/>
-              <a:t>initializeFEEquationSystems</a:t>
-            </a:r>
-            <a:r>
-              <a:rPr lang="en-US" sz="1700" dirty="0"/>
-              <a:t>(); </a:t>
-            </a:r>
-            <a:endParaRPr lang="en-US" sz="1700" dirty="0" smtClean="0"/>
-          </a:p>
-          <a:p>
-            <a:r>
-              <a:rPr lang="en-US" sz="1700" dirty="0" err="1" smtClean="0"/>
-              <a:t>IBFEMethod</a:t>
-            </a:r>
-            <a:r>
-              <a:rPr lang="en-US" sz="1700" dirty="0"/>
-              <a:t>::</a:t>
-            </a:r>
-            <a:r>
-              <a:rPr lang="en-US" sz="1700" dirty="0" err="1"/>
-              <a:t>LagBodyForceFcnData</a:t>
-            </a:r>
-            <a:r>
-              <a:rPr lang="en-US" sz="1700" dirty="0"/>
-              <a:t> target1_force_data(target1_force_function);    </a:t>
-            </a:r>
-            <a:endParaRPr lang="en-US" sz="1700" dirty="0" smtClean="0"/>
-          </a:p>
-          <a:p>
-            <a:r>
-              <a:rPr lang="en-US" sz="1700" dirty="0" err="1" smtClean="0"/>
-              <a:t>IBFEMethod</a:t>
-            </a:r>
-            <a:r>
-              <a:rPr lang="en-US" sz="1700" dirty="0"/>
-              <a:t>::PK1StressFcnData PK1_dev_stress_data(PK1_dev_stress_function);    </a:t>
-            </a:r>
-            <a:endParaRPr lang="en-US" sz="1700" dirty="0" smtClean="0"/>
-          </a:p>
-          <a:p>
-            <a:r>
-              <a:rPr lang="en-US" sz="1700" dirty="0" err="1" smtClean="0"/>
-              <a:t>IBFEMethod</a:t>
-            </a:r>
-            <a:r>
-              <a:rPr lang="en-US" sz="1700" dirty="0"/>
-              <a:t>::PK1StressFcnData PK1_dil_stress_data(PK1_dil_stress_function);    </a:t>
-            </a:r>
-            <a:endParaRPr lang="en-US" sz="1700" dirty="0" smtClean="0"/>
-          </a:p>
-          <a:p>
-            <a:endParaRPr lang="en-US" sz="1700" dirty="0" smtClean="0"/>
-          </a:p>
-          <a:p>
-            <a:r>
-              <a:rPr lang="en-US" sz="1700" dirty="0" smtClean="0"/>
-              <a:t>PK1_dev_stress_data.quad_order </a:t>
-            </a:r>
-            <a:r>
-              <a:rPr lang="en-US" sz="1700" dirty="0"/>
-              <a:t>= Utility::</a:t>
-            </a:r>
-            <a:r>
-              <a:rPr lang="en-US" sz="1700" dirty="0" err="1"/>
-              <a:t>string_to_enum</a:t>
-            </a:r>
-            <a:r>
-              <a:rPr lang="en-US" sz="1700" dirty="0"/>
-              <a:t>&lt;</a:t>
-            </a:r>
-            <a:r>
-              <a:rPr lang="en-US" sz="1700" dirty="0" err="1"/>
-              <a:t>libMeshEnums</a:t>
-            </a:r>
-            <a:r>
-              <a:rPr lang="en-US" sz="1700" dirty="0"/>
-              <a:t>::Order&gt;(</a:t>
-            </a:r>
-            <a:r>
-              <a:rPr lang="en-US" sz="1700" dirty="0" err="1"/>
-              <a:t>input_db</a:t>
-            </a:r>
-            <a:r>
-              <a:rPr lang="en-US" sz="1700" dirty="0"/>
-              <a:t>-&gt;</a:t>
-            </a:r>
-            <a:r>
-              <a:rPr lang="en-US" sz="1700" dirty="0" err="1"/>
-              <a:t>getStringWithDefault</a:t>
-            </a:r>
-            <a:r>
-              <a:rPr lang="en-US" sz="1700" dirty="0"/>
-              <a:t>("PK1_DEV_QUAD_ORDER","THIRD"));    </a:t>
-            </a:r>
-            <a:endParaRPr lang="en-US" sz="1700" dirty="0" smtClean="0"/>
-          </a:p>
-          <a:p>
-            <a:r>
-              <a:rPr lang="en-US" sz="1700" dirty="0" smtClean="0"/>
-              <a:t>PK1_dil_stress_data.quad_order </a:t>
-            </a:r>
-            <a:r>
-              <a:rPr lang="en-US" sz="1700" dirty="0"/>
-              <a:t>= Utility::</a:t>
-            </a:r>
-            <a:r>
-              <a:rPr lang="en-US" sz="1700" dirty="0" err="1"/>
-              <a:t>string_to_enum</a:t>
-            </a:r>
-            <a:r>
-              <a:rPr lang="en-US" sz="1700" dirty="0"/>
-              <a:t>&lt;</a:t>
-            </a:r>
-            <a:r>
-              <a:rPr lang="en-US" sz="1700" dirty="0" err="1"/>
-              <a:t>libMeshEnums</a:t>
-            </a:r>
-            <a:r>
-              <a:rPr lang="en-US" sz="1700" dirty="0"/>
-              <a:t>::Order&gt;(</a:t>
-            </a:r>
-            <a:r>
-              <a:rPr lang="en-US" sz="1700" dirty="0" err="1"/>
-              <a:t>input_db</a:t>
-            </a:r>
-            <a:r>
-              <a:rPr lang="en-US" sz="1700" dirty="0"/>
-              <a:t>-&gt;</a:t>
-            </a:r>
-            <a:r>
-              <a:rPr lang="en-US" sz="1700" dirty="0" err="1"/>
-              <a:t>getStringWithDefault</a:t>
-            </a:r>
-            <a:r>
-              <a:rPr lang="en-US" sz="1700" dirty="0"/>
-              <a:t>("PK1_DIL_QUAD_ORDER","FIRST"));    </a:t>
-            </a:r>
-            <a:endParaRPr lang="en-US" sz="1700" dirty="0" smtClean="0"/>
-          </a:p>
-          <a:p>
-            <a:endParaRPr lang="en-US" sz="1700" dirty="0" smtClean="0"/>
-          </a:p>
-          <a:p>
-            <a:r>
-              <a:rPr lang="en-US" sz="1700" dirty="0" err="1" smtClean="0"/>
-              <a:t>ib_method_ops</a:t>
-            </a:r>
-            <a:r>
-              <a:rPr lang="en-US" sz="1700" dirty="0" smtClean="0"/>
-              <a:t>-</a:t>
-            </a:r>
-            <a:r>
-              <a:rPr lang="en-US" sz="1700" dirty="0"/>
-              <a:t>&gt;</a:t>
-            </a:r>
-            <a:r>
-              <a:rPr lang="en-US" sz="1700" dirty="0" err="1"/>
-              <a:t>registerLagBodyForceFunction</a:t>
-            </a:r>
-            <a:r>
-              <a:rPr lang="en-US" sz="1700" dirty="0"/>
-              <a:t>(target1_force_data, 0);   </a:t>
-            </a:r>
-            <a:endParaRPr lang="en-US" sz="1700" dirty="0" smtClean="0"/>
-          </a:p>
-          <a:p>
-            <a:r>
-              <a:rPr lang="en-US" sz="1700" dirty="0" err="1" smtClean="0"/>
-              <a:t>ib_method_ops</a:t>
-            </a:r>
-            <a:r>
-              <a:rPr lang="en-US" sz="1700" dirty="0" smtClean="0"/>
-              <a:t>-</a:t>
-            </a:r>
-            <a:r>
-              <a:rPr lang="en-US" sz="1700" dirty="0"/>
-              <a:t>&gt;registerPK1StressFunction(PK1_dev_stress_data, 0);    </a:t>
-            </a:r>
-            <a:endParaRPr lang="en-US" sz="1700" dirty="0" smtClean="0"/>
-          </a:p>
-          <a:p>
-            <a:r>
-              <a:rPr lang="en-US" sz="1700" dirty="0" err="1" smtClean="0"/>
-              <a:t>ib_method_ops</a:t>
-            </a:r>
-            <a:r>
-              <a:rPr lang="en-US" sz="1700" dirty="0" smtClean="0"/>
-              <a:t>-</a:t>
-            </a:r>
-            <a:r>
-              <a:rPr lang="en-US" sz="1700" dirty="0"/>
-              <a:t>&gt;registerPK1StressFunction(PK1_dev_stress_data, 1);    </a:t>
-            </a:r>
-            <a:endParaRPr lang="en-US" sz="1700" dirty="0" smtClean="0"/>
-          </a:p>
-          <a:p>
-            <a:r>
-              <a:rPr lang="en-US" sz="1700" dirty="0" err="1" smtClean="0"/>
-              <a:t>ib_method_ops</a:t>
-            </a:r>
-            <a:r>
-              <a:rPr lang="en-US" sz="1700" dirty="0" smtClean="0"/>
-              <a:t>-</a:t>
-            </a:r>
-            <a:r>
-              <a:rPr lang="en-US" sz="1700" dirty="0"/>
-              <a:t>&gt;registerPK1StressFunction(PK1_dil_stress_data, 0);    </a:t>
-            </a:r>
-            <a:endParaRPr lang="en-US" sz="1700" dirty="0" smtClean="0"/>
-          </a:p>
-          <a:p>
-            <a:r>
-              <a:rPr lang="en-US" sz="1700" dirty="0" err="1" smtClean="0"/>
-              <a:t>ib_method_ops</a:t>
-            </a:r>
-            <a:r>
-              <a:rPr lang="en-US" sz="1700" dirty="0" smtClean="0"/>
-              <a:t>-</a:t>
-            </a:r>
-            <a:r>
-              <a:rPr lang="en-US" sz="1700" dirty="0"/>
-              <a:t>&gt;registerPK1StressFunction(PK1_dil_stress_data, 1);        </a:t>
-            </a:r>
-            <a:endParaRPr lang="en-US" sz="1700" dirty="0" smtClean="0"/>
-          </a:p>
-          <a:p>
-            <a:endParaRPr lang="en-US" sz="1700" dirty="0"/>
-          </a:p>
-          <a:p>
-            <a:r>
-              <a:rPr lang="en-US" sz="1700" dirty="0" err="1" smtClean="0"/>
-              <a:t>EquationSystems</a:t>
-            </a:r>
-            <a:r>
-              <a:rPr lang="en-US" sz="1700" dirty="0"/>
-              <a:t>* mesh1_equation_systems = </a:t>
-            </a:r>
-            <a:r>
-              <a:rPr lang="en-US" sz="1700" dirty="0" err="1"/>
-              <a:t>ib_method_ops</a:t>
-            </a:r>
-            <a:r>
-              <a:rPr lang="en-US" sz="1700" dirty="0"/>
-              <a:t>-&gt;</a:t>
-            </a:r>
-            <a:r>
-              <a:rPr lang="en-US" sz="1700" dirty="0" err="1"/>
-              <a:t>getFEDataManager</a:t>
-            </a:r>
-            <a:r>
-              <a:rPr lang="en-US" sz="1700" dirty="0"/>
-              <a:t>(0)-&gt;</a:t>
-            </a:r>
-            <a:r>
-              <a:rPr lang="en-US" sz="1700" dirty="0" err="1"/>
-              <a:t>getEquationSystems</a:t>
-            </a:r>
-            <a:r>
-              <a:rPr lang="en-US" sz="1700" dirty="0"/>
-              <a:t>();        </a:t>
-            </a:r>
-            <a:r>
-              <a:rPr lang="en-US" sz="1700" dirty="0" err="1"/>
-              <a:t>EquationSystems</a:t>
-            </a:r>
-            <a:r>
-              <a:rPr lang="en-US" sz="1700" dirty="0"/>
-              <a:t>* mesh2_equation_systems = </a:t>
-            </a:r>
-            <a:r>
-              <a:rPr lang="en-US" sz="1700" dirty="0" err="1"/>
-              <a:t>ib_method_ops</a:t>
-            </a:r>
-            <a:r>
-              <a:rPr lang="en-US" sz="1700" dirty="0"/>
-              <a:t>-&gt;</a:t>
-            </a:r>
-            <a:r>
-              <a:rPr lang="en-US" sz="1700" dirty="0" err="1"/>
-              <a:t>getFEDataManager</a:t>
-            </a:r>
-            <a:r>
-              <a:rPr lang="en-US" sz="1700" dirty="0"/>
-              <a:t>(1)-&gt;</a:t>
-            </a:r>
-            <a:r>
-              <a:rPr lang="en-US" sz="1700" dirty="0" err="1"/>
-              <a:t>getEquationSystems</a:t>
-            </a:r>
-            <a:r>
-              <a:rPr lang="en-US" sz="1700" dirty="0"/>
-              <a:t>();</a:t>
-            </a:r>
-          </a:p>
-        </p:txBody>
-      </p:sp>
-    </p:spTree>
-    <p:extLst>
-      <p:ext uri="{BB962C8B-B14F-4D97-AF65-F5344CB8AC3E}">
-        <p14:creationId xmlns:p14="http://schemas.microsoft.com/office/powerpoint/2010/main" val="501302033"/>
-      </p:ext>
-    </p:extLst>
-  </p:cSld>
-  <p:clrMapOvr>
-    <a:masterClrMapping/>
-  </p:clrMapOvr>
-  <p:timing>
-    <p:tnLst>
-      <p:par>
-        <p:cTn id="1" dur="indefinite" restart="never" nodeType="tmRoot"/>
-      </p:par>
-    </p:tnLst>
-  </p:timing>
-</p:sld>
-</file>
-
 <file path=ppt/slides/slide19.xml><?xml version="1.0" encoding="utf-8"?>
 <p:sld xmlns:a="http://schemas.openxmlformats.org/drawingml/2006/main" xmlns:r="http://schemas.openxmlformats.org/officeDocument/2006/relationships" xmlns:p="http://schemas.openxmlformats.org/presentationml/2006/main">
   <p:cSld>
@@ -7826,14 +7614,19 @@
             <p:ph type="title"/>
           </p:nvPr>
         </p:nvSpPr>
-        <p:spPr/>
+        <p:spPr>
+          <a:xfrm>
+            <a:off x="774032" y="284915"/>
+            <a:ext cx="10515600" cy="1325563"/>
+          </a:xfrm>
+        </p:spPr>
         <p:txBody>
           <a:bodyPr/>
           <a:lstStyle/>
           <a:p>
             <a:r>
-              <a:rPr lang="en-US" dirty="0" smtClean="0"/>
-              <a:t>Other changes from earlier versions</a:t>
+              <a:rPr lang="en" b="1" dirty="0"/>
+              <a:t>Relevant lines in main.C</a:t>
             </a:r>
             <a:endParaRPr lang="en-US" dirty="0"/>
           </a:p>
@@ -7847,8 +7640,8 @@
         </p:nvSpPr>
         <p:spPr>
           <a:xfrm>
-            <a:off x="705853" y="2449704"/>
-            <a:ext cx="10647947" cy="2031325"/>
+            <a:off x="774032" y="1491384"/>
+            <a:ext cx="10904621" cy="5062924"/>
           </a:xfrm>
           <a:prstGeom prst="rect">
             <a:avLst/>
@@ -7861,190 +7654,317 @@
           <a:lstStyle/>
           <a:p>
             <a:r>
-              <a:rPr lang="en-US" dirty="0">
-                <a:solidFill>
-                  <a:srgbClr val="FF0000"/>
-                </a:solidFill>
-              </a:rPr>
-              <a:t>These lines</a:t>
-            </a:r>
-          </a:p>
-          <a:p>
-            <a:r>
-              <a:rPr lang="en-US" dirty="0" err="1"/>
-              <a:t>AutoPtr</a:t>
-            </a:r>
-            <a:r>
-              <a:rPr lang="en-US" dirty="0"/>
+              <a:rPr lang="en-US" sz="1700" dirty="0"/>
+              <a:t> // Configure the IBFE solver.	</a:t>
+            </a:r>
+            <a:endParaRPr lang="en-US" sz="1700" dirty="0" smtClean="0"/>
+          </a:p>
+          <a:p>
+            <a:r>
+              <a:rPr lang="en-US" sz="1700" dirty="0" err="1" smtClean="0"/>
+              <a:t>ib_method_ops</a:t>
+            </a:r>
+            <a:r>
+              <a:rPr lang="en-US" sz="1700" dirty="0" smtClean="0"/>
+              <a:t>-</a:t>
+            </a:r>
+            <a:r>
+              <a:rPr lang="en-US" sz="1700" dirty="0"/>
+              <a:t>&gt;</a:t>
+            </a:r>
+            <a:r>
+              <a:rPr lang="en-US" sz="1700" dirty="0" err="1"/>
+              <a:t>initializeFEEquationSystems</a:t>
+            </a:r>
+            <a:r>
+              <a:rPr lang="en-US" sz="1700" dirty="0"/>
+              <a:t>(); </a:t>
+            </a:r>
+            <a:endParaRPr lang="en-US" sz="1700" dirty="0" smtClean="0"/>
+          </a:p>
+          <a:p>
+            <a:r>
+              <a:rPr lang="en-US" sz="1700" dirty="0" err="1" smtClean="0"/>
+              <a:t>IBFEMethod</a:t>
+            </a:r>
+            <a:r>
+              <a:rPr lang="en-US" sz="1700" dirty="0"/>
+              <a:t>::</a:t>
+            </a:r>
+            <a:r>
+              <a:rPr lang="en-US" sz="1700" dirty="0" err="1"/>
+              <a:t>LagBodyForceFcnData</a:t>
+            </a:r>
+            <a:r>
+              <a:rPr lang="en-US" sz="1700" dirty="0"/>
+              <a:t> target1_force_data(target1_force_function);    </a:t>
+            </a:r>
+            <a:endParaRPr lang="en-US" sz="1700" dirty="0" smtClean="0"/>
+          </a:p>
+          <a:p>
+            <a:r>
+              <a:rPr lang="en-US" sz="1700" dirty="0" err="1" smtClean="0"/>
+              <a:t>IBFEMethod</a:t>
+            </a:r>
+            <a:r>
+              <a:rPr lang="en-US" sz="1700" dirty="0"/>
+              <a:t>::PK1StressFcnData PK1_dev_stress_data(PK1_dev_stress_function);    </a:t>
+            </a:r>
+            <a:endParaRPr lang="en-US" sz="1700" dirty="0" smtClean="0"/>
+          </a:p>
+          <a:p>
+            <a:r>
+              <a:rPr lang="en-US" sz="1700" dirty="0" err="1" smtClean="0"/>
+              <a:t>IBFEMethod</a:t>
+            </a:r>
+            <a:r>
+              <a:rPr lang="en-US" sz="1700" dirty="0"/>
+              <a:t>::PK1StressFcnData PK1_dil_stress_data(PK1_dil_stress_function);    </a:t>
+            </a:r>
+            <a:endParaRPr lang="en-US" sz="1700" dirty="0" smtClean="0"/>
+          </a:p>
+          <a:p>
+            <a:endParaRPr lang="en-US" sz="1700" dirty="0" smtClean="0"/>
+          </a:p>
+          <a:p>
+            <a:r>
+              <a:rPr lang="en-US" sz="1700" dirty="0" smtClean="0"/>
+              <a:t>PK1_dev_stress_data.quad_order </a:t>
+            </a:r>
+            <a:r>
+              <a:rPr lang="en-US" sz="1700" dirty="0"/>
+              <a:t>= Utility::</a:t>
+            </a:r>
+            <a:r>
+              <a:rPr lang="en-US" sz="1700" dirty="0" err="1"/>
+              <a:t>string_to_enum</a:t>
+            </a:r>
+            <a:r>
+              <a:rPr lang="en-US" sz="1700" dirty="0"/>
               <a:t>&lt;</a:t>
             </a:r>
             <a:r>
-              <a:rPr lang="en-US" dirty="0" err="1"/>
-              <a:t>ExodusII_IO</a:t>
-            </a:r>
-            <a:r>
-              <a:rPr lang="en-US" dirty="0"/>
-              <a:t>&gt; mesh1_exodus_io(</a:t>
-            </a:r>
-            <a:r>
-              <a:rPr lang="en-US" dirty="0" err="1"/>
-              <a:t>uses_exodus</a:t>
-            </a:r>
-            <a:r>
-              <a:rPr lang="en-US" dirty="0"/>
-              <a:t> ? new </a:t>
-            </a:r>
-            <a:r>
-              <a:rPr lang="en-US" dirty="0" err="1"/>
-              <a:t>ExodusII_IO</a:t>
-            </a:r>
-            <a:r>
-              <a:rPr lang="en-US" dirty="0"/>
-              <a:t>(mesh1) : NULL);    </a:t>
-            </a:r>
-          </a:p>
-          <a:p>
-            <a:r>
-              <a:rPr lang="en-US" dirty="0" err="1"/>
-              <a:t>AutoPtr</a:t>
-            </a:r>
-            <a:r>
-              <a:rPr lang="en-US" dirty="0"/>
+              <a:rPr lang="en-US" sz="1700" dirty="0" err="1"/>
+              <a:t>libMeshEnums</a:t>
+            </a:r>
+            <a:r>
+              <a:rPr lang="en-US" sz="1700" dirty="0"/>
+              <a:t>::Order&gt;(</a:t>
+            </a:r>
+            <a:r>
+              <a:rPr lang="en-US" sz="1700" dirty="0" err="1"/>
+              <a:t>input_db</a:t>
+            </a:r>
+            <a:r>
+              <a:rPr lang="en-US" sz="1700" dirty="0"/>
+              <a:t>-&gt;</a:t>
+            </a:r>
+            <a:r>
+              <a:rPr lang="en-US" sz="1700" dirty="0" err="1"/>
+              <a:t>getStringWithDefault</a:t>
+            </a:r>
+            <a:r>
+              <a:rPr lang="en-US" sz="1700" dirty="0"/>
+              <a:t>("PK1_DEV_QUAD_ORDER","THIRD"));    </a:t>
+            </a:r>
+            <a:endParaRPr lang="en-US" sz="1700" dirty="0" smtClean="0"/>
+          </a:p>
+          <a:p>
+            <a:r>
+              <a:rPr lang="en-US" sz="1700" dirty="0" smtClean="0"/>
+              <a:t>PK1_dil_stress_data.quad_order </a:t>
+            </a:r>
+            <a:r>
+              <a:rPr lang="en-US" sz="1700" dirty="0"/>
+              <a:t>= Utility::</a:t>
+            </a:r>
+            <a:r>
+              <a:rPr lang="en-US" sz="1700" dirty="0" err="1"/>
+              <a:t>string_to_enum</a:t>
+            </a:r>
+            <a:r>
+              <a:rPr lang="en-US" sz="1700" dirty="0"/>
               <a:t>&lt;</a:t>
             </a:r>
             <a:r>
-              <a:rPr lang="en-US" dirty="0" err="1"/>
-              <a:t>ExodusII_IO</a:t>
-            </a:r>
-            <a:r>
-              <a:rPr lang="en-US" dirty="0"/>
-              <a:t>&gt; mesh2_exodus_io(</a:t>
-            </a:r>
-            <a:r>
-              <a:rPr lang="en-US" dirty="0" err="1"/>
-              <a:t>uses_exodus</a:t>
-            </a:r>
-            <a:r>
-              <a:rPr lang="en-US" dirty="0"/>
-              <a:t> ? new </a:t>
-            </a:r>
-            <a:r>
-              <a:rPr lang="en-US" dirty="0" err="1"/>
-              <a:t>ExodusII_IO</a:t>
-            </a:r>
-            <a:r>
-              <a:rPr lang="en-US" dirty="0"/>
-              <a:t>(mesh2) : NULL);	</a:t>
-            </a:r>
-          </a:p>
-          <a:p>
-            <a:endParaRPr lang="en-US" dirty="0"/>
-          </a:p>
-          <a:p>
-            <a:r>
-              <a:rPr lang="en-US" dirty="0">
-                <a:solidFill>
-                  <a:srgbClr val="FF0000"/>
-                </a:solidFill>
-              </a:rPr>
-              <a:t>Should be changed to these </a:t>
-            </a:r>
-            <a:r>
-              <a:rPr lang="en-US" dirty="0" smtClean="0">
-                <a:solidFill>
-                  <a:srgbClr val="FF0000"/>
-                </a:solidFill>
-              </a:rPr>
-              <a:t>lines</a:t>
-            </a:r>
-            <a:endParaRPr lang="en-US" dirty="0"/>
-          </a:p>
-          <a:p>
-            <a:r>
-              <a:rPr lang="en-US" dirty="0" err="1" smtClean="0"/>
-              <a:t>std</a:t>
-            </a:r>
-            <a:r>
-              <a:rPr lang="en-US" dirty="0"/>
-              <a:t>::</a:t>
-            </a:r>
-            <a:r>
-              <a:rPr lang="en-US" dirty="0" err="1"/>
-              <a:t>unique_ptr</a:t>
-            </a:r>
-            <a:r>
-              <a:rPr lang="en-US" dirty="0"/>
-              <a:t>&lt;</a:t>
-            </a:r>
-            <a:r>
-              <a:rPr lang="en-US" dirty="0" err="1"/>
-              <a:t>ExodusII_IO</a:t>
-            </a:r>
-            <a:r>
-              <a:rPr lang="en-US" dirty="0"/>
-              <a:t>&gt; mesh1_exodus_io(</a:t>
-            </a:r>
-            <a:r>
-              <a:rPr lang="en-US" dirty="0" err="1"/>
-              <a:t>uses_exodus</a:t>
-            </a:r>
-            <a:r>
-              <a:rPr lang="en-US" dirty="0"/>
-              <a:t> ? new </a:t>
-            </a:r>
-            <a:r>
-              <a:rPr lang="en-US" dirty="0" err="1"/>
-              <a:t>ExodusII_IO</a:t>
-            </a:r>
-            <a:r>
-              <a:rPr lang="en-US" dirty="0"/>
-              <a:t>(mesh1) : NULL</a:t>
-            </a:r>
-            <a:r>
-              <a:rPr lang="en-US" dirty="0" smtClean="0"/>
-              <a:t>);</a:t>
-            </a:r>
-          </a:p>
-          <a:p>
-            <a:r>
-              <a:rPr lang="en-US" dirty="0" err="1" smtClean="0"/>
-              <a:t>std</a:t>
-            </a:r>
-            <a:r>
-              <a:rPr lang="en-US" dirty="0"/>
-              <a:t>::</a:t>
-            </a:r>
-            <a:r>
-              <a:rPr lang="en-US" dirty="0" err="1"/>
-              <a:t>unique_ptr</a:t>
-            </a:r>
-            <a:r>
-              <a:rPr lang="en-US" dirty="0"/>
-              <a:t>&lt;</a:t>
-            </a:r>
-            <a:r>
-              <a:rPr lang="en-US" dirty="0" err="1"/>
-              <a:t>ExodusII_IO</a:t>
-            </a:r>
-            <a:r>
-              <a:rPr lang="en-US" dirty="0"/>
-              <a:t>&gt; mesh2_exodus_io(</a:t>
-            </a:r>
-            <a:r>
-              <a:rPr lang="en-US" dirty="0" err="1"/>
-              <a:t>uses_exodus</a:t>
-            </a:r>
-            <a:r>
-              <a:rPr lang="en-US" dirty="0"/>
-              <a:t> ? new </a:t>
-            </a:r>
-            <a:r>
-              <a:rPr lang="en-US" dirty="0" err="1"/>
-              <a:t>ExodusII_IO</a:t>
-            </a:r>
-            <a:r>
-              <a:rPr lang="en-US" dirty="0"/>
-              <a:t>(mesh2) : NULL);</a:t>
+              <a:rPr lang="en-US" sz="1700" dirty="0" err="1"/>
+              <a:t>libMeshEnums</a:t>
+            </a:r>
+            <a:r>
+              <a:rPr lang="en-US" sz="1700" dirty="0"/>
+              <a:t>::Order&gt;(</a:t>
+            </a:r>
+            <a:r>
+              <a:rPr lang="en-US" sz="1700" dirty="0" err="1"/>
+              <a:t>input_db</a:t>
+            </a:r>
+            <a:r>
+              <a:rPr lang="en-US" sz="1700" dirty="0"/>
+              <a:t>-&gt;</a:t>
+            </a:r>
+            <a:r>
+              <a:rPr lang="en-US" sz="1700" dirty="0" err="1"/>
+              <a:t>getStringWithDefault</a:t>
+            </a:r>
+            <a:r>
+              <a:rPr lang="en-US" sz="1700" dirty="0"/>
+              <a:t>("PK1_DIL_QUAD_ORDER","FIRST"));    </a:t>
+            </a:r>
+            <a:endParaRPr lang="en-US" sz="1700" dirty="0" smtClean="0"/>
+          </a:p>
+          <a:p>
+            <a:endParaRPr lang="en-US" sz="1700" dirty="0" smtClean="0"/>
+          </a:p>
+          <a:p>
+            <a:r>
+              <a:rPr lang="en-US" sz="1700" dirty="0" err="1" smtClean="0"/>
+              <a:t>ib_method_ops</a:t>
+            </a:r>
+            <a:r>
+              <a:rPr lang="en-US" sz="1700" dirty="0" smtClean="0"/>
+              <a:t>-</a:t>
+            </a:r>
+            <a:r>
+              <a:rPr lang="en-US" sz="1700" dirty="0"/>
+              <a:t>&gt;</a:t>
+            </a:r>
+            <a:r>
+              <a:rPr lang="en-US" sz="1700" dirty="0" err="1"/>
+              <a:t>registerLagBodyForceFunction</a:t>
+            </a:r>
+            <a:r>
+              <a:rPr lang="en-US" sz="1700" dirty="0"/>
+              <a:t>(target1_force_data, 0);   </a:t>
+            </a:r>
+            <a:endParaRPr lang="en-US" sz="1700" dirty="0" smtClean="0"/>
+          </a:p>
+          <a:p>
+            <a:r>
+              <a:rPr lang="en-US" sz="1700" dirty="0" err="1" smtClean="0"/>
+              <a:t>ib_method_ops</a:t>
+            </a:r>
+            <a:r>
+              <a:rPr lang="en-US" sz="1700" dirty="0" smtClean="0"/>
+              <a:t>-</a:t>
+            </a:r>
+            <a:r>
+              <a:rPr lang="en-US" sz="1700" dirty="0"/>
+              <a:t>&gt;registerPK1StressFunction(PK1_dev_stress_data, 0);    </a:t>
+            </a:r>
+            <a:endParaRPr lang="en-US" sz="1700" dirty="0" smtClean="0"/>
+          </a:p>
+          <a:p>
+            <a:r>
+              <a:rPr lang="en-US" sz="1700" dirty="0" err="1" smtClean="0"/>
+              <a:t>ib_method_ops</a:t>
+            </a:r>
+            <a:r>
+              <a:rPr lang="en-US" sz="1700" dirty="0" smtClean="0"/>
+              <a:t>-</a:t>
+            </a:r>
+            <a:r>
+              <a:rPr lang="en-US" sz="1700" dirty="0"/>
+              <a:t>&gt;registerPK1StressFunction(PK1_dev_stress_data, 1);    </a:t>
+            </a:r>
+            <a:endParaRPr lang="en-US" sz="1700" dirty="0" smtClean="0"/>
+          </a:p>
+          <a:p>
+            <a:r>
+              <a:rPr lang="en-US" sz="1700" dirty="0" err="1" smtClean="0"/>
+              <a:t>ib_method_ops</a:t>
+            </a:r>
+            <a:r>
+              <a:rPr lang="en-US" sz="1700" dirty="0" smtClean="0"/>
+              <a:t>-</a:t>
+            </a:r>
+            <a:r>
+              <a:rPr lang="en-US" sz="1700" dirty="0"/>
+              <a:t>&gt;registerPK1StressFunction(PK1_dil_stress_data, 0);    </a:t>
+            </a:r>
+            <a:endParaRPr lang="en-US" sz="1700" dirty="0" smtClean="0"/>
+          </a:p>
+          <a:p>
+            <a:r>
+              <a:rPr lang="en-US" sz="1700" dirty="0" err="1" smtClean="0"/>
+              <a:t>ib_method_ops</a:t>
+            </a:r>
+            <a:r>
+              <a:rPr lang="en-US" sz="1700" dirty="0" smtClean="0"/>
+              <a:t>-</a:t>
+            </a:r>
+            <a:r>
+              <a:rPr lang="en-US" sz="1700" dirty="0"/>
+              <a:t>&gt;registerPK1StressFunction(PK1_dil_stress_data, 1);        </a:t>
+            </a:r>
+            <a:endParaRPr lang="en-US" sz="1700" dirty="0" smtClean="0"/>
+          </a:p>
+          <a:p>
+            <a:endParaRPr lang="en-US" sz="1700" dirty="0"/>
+          </a:p>
+          <a:p>
+            <a:r>
+              <a:rPr lang="en-US" sz="1700" dirty="0" err="1" smtClean="0"/>
+              <a:t>EquationSystems</a:t>
+            </a:r>
+            <a:r>
+              <a:rPr lang="en-US" sz="1700" dirty="0"/>
+              <a:t>* mesh1_equation_systems = </a:t>
+            </a:r>
+            <a:r>
+              <a:rPr lang="en-US" sz="1700" dirty="0" err="1"/>
+              <a:t>ib_method_ops</a:t>
+            </a:r>
+            <a:r>
+              <a:rPr lang="en-US" sz="1700" dirty="0"/>
+              <a:t>-&gt;</a:t>
+            </a:r>
+            <a:r>
+              <a:rPr lang="en-US" sz="1700" dirty="0" err="1"/>
+              <a:t>getFEDataManager</a:t>
+            </a:r>
+            <a:r>
+              <a:rPr lang="en-US" sz="1700" dirty="0"/>
+              <a:t>(0)-&gt;</a:t>
+            </a:r>
+            <a:r>
+              <a:rPr lang="en-US" sz="1700" dirty="0" err="1"/>
+              <a:t>getEquationSystems</a:t>
+            </a:r>
+            <a:r>
+              <a:rPr lang="en-US" sz="1700" dirty="0"/>
+              <a:t>();        </a:t>
+            </a:r>
+            <a:r>
+              <a:rPr lang="en-US" sz="1700" dirty="0" err="1"/>
+              <a:t>EquationSystems</a:t>
+            </a:r>
+            <a:r>
+              <a:rPr lang="en-US" sz="1700" dirty="0"/>
+              <a:t>* mesh2_equation_systems = </a:t>
+            </a:r>
+            <a:r>
+              <a:rPr lang="en-US" sz="1700" dirty="0" err="1"/>
+              <a:t>ib_method_ops</a:t>
+            </a:r>
+            <a:r>
+              <a:rPr lang="en-US" sz="1700" dirty="0"/>
+              <a:t>-&gt;</a:t>
+            </a:r>
+            <a:r>
+              <a:rPr lang="en-US" sz="1700" dirty="0" err="1"/>
+              <a:t>getFEDataManager</a:t>
+            </a:r>
+            <a:r>
+              <a:rPr lang="en-US" sz="1700" dirty="0"/>
+              <a:t>(1)-&gt;</a:t>
+            </a:r>
+            <a:r>
+              <a:rPr lang="en-US" sz="1700" dirty="0" err="1"/>
+              <a:t>getEquationSystems</a:t>
+            </a:r>
+            <a:r>
+              <a:rPr lang="en-US" sz="1700" dirty="0"/>
+              <a:t>();</a:t>
             </a:r>
           </a:p>
         </p:txBody>
@@ -8052,7 +7972,7 @@
     </p:spTree>
     <p:extLst>
       <p:ext uri="{BB962C8B-B14F-4D97-AF65-F5344CB8AC3E}">
-        <p14:creationId xmlns:p14="http://schemas.microsoft.com/office/powerpoint/2010/main" val="1589379641"/>
+        <p14:creationId xmlns:p14="http://schemas.microsoft.com/office/powerpoint/2010/main" val="501302033"/>
       </p:ext>
     </p:extLst>
   </p:cSld>
@@ -8190,6 +8110,276 @@
     <p:extLst>
       <p:ext uri="{BB962C8B-B14F-4D97-AF65-F5344CB8AC3E}">
         <p14:creationId xmlns:p14="http://schemas.microsoft.com/office/powerpoint/2010/main" val="2764069141"/>
+      </p:ext>
+    </p:extLst>
+  </p:cSld>
+  <p:clrMapOvr>
+    <a:masterClrMapping/>
+  </p:clrMapOvr>
+  <p:timing>
+    <p:tnLst>
+      <p:par>
+        <p:cTn id="1" dur="indefinite" restart="never" nodeType="tmRoot"/>
+      </p:par>
+    </p:tnLst>
+  </p:timing>
+</p:sld>
+</file>
+
+<file path=ppt/slides/slide20.xml><?xml version="1.0" encoding="utf-8"?>
+<p:sld xmlns:a="http://schemas.openxmlformats.org/drawingml/2006/main" xmlns:r="http://schemas.openxmlformats.org/officeDocument/2006/relationships" xmlns:p="http://schemas.openxmlformats.org/presentationml/2006/main">
+  <p:cSld>
+    <p:spTree>
+      <p:nvGrpSpPr>
+        <p:cNvPr id="1" name=""/>
+        <p:cNvGrpSpPr/>
+        <p:nvPr/>
+      </p:nvGrpSpPr>
+      <p:grpSpPr>
+        <a:xfrm>
+          <a:off x="0" y="0"/>
+          <a:ext cx="0" cy="0"/>
+          <a:chOff x="0" y="0"/>
+          <a:chExt cx="0" cy="0"/>
+        </a:xfrm>
+      </p:grpSpPr>
+      <p:sp>
+        <p:nvSpPr>
+          <p:cNvPr id="2" name="Title 1"/>
+          <p:cNvSpPr>
+            <a:spLocks noGrp="1"/>
+          </p:cNvSpPr>
+          <p:nvPr>
+            <p:ph type="title"/>
+          </p:nvPr>
+        </p:nvSpPr>
+        <p:spPr/>
+        <p:txBody>
+          <a:bodyPr/>
+          <a:lstStyle/>
+          <a:p>
+            <a:r>
+              <a:rPr lang="en-US" dirty="0" smtClean="0"/>
+              <a:t>Other changes from earlier versions</a:t>
+            </a:r>
+            <a:endParaRPr lang="en-US" dirty="0"/>
+          </a:p>
+        </p:txBody>
+      </p:sp>
+      <p:sp>
+        <p:nvSpPr>
+          <p:cNvPr id="4" name="Rectangle 3"/>
+          <p:cNvSpPr/>
+          <p:nvPr/>
+        </p:nvSpPr>
+        <p:spPr>
+          <a:xfrm>
+            <a:off x="705853" y="2449704"/>
+            <a:ext cx="10647947" cy="2031325"/>
+          </a:xfrm>
+          <a:prstGeom prst="rect">
+            <a:avLst/>
+          </a:prstGeom>
+        </p:spPr>
+        <p:txBody>
+          <a:bodyPr wrap="square">
+            <a:spAutoFit/>
+          </a:bodyPr>
+          <a:lstStyle/>
+          <a:p>
+            <a:r>
+              <a:rPr lang="en-US" dirty="0">
+                <a:solidFill>
+                  <a:srgbClr val="FF0000"/>
+                </a:solidFill>
+              </a:rPr>
+              <a:t>These lines</a:t>
+            </a:r>
+          </a:p>
+          <a:p>
+            <a:r>
+              <a:rPr lang="en-US" dirty="0" err="1"/>
+              <a:t>AutoPtr</a:t>
+            </a:r>
+            <a:r>
+              <a:rPr lang="en-US" dirty="0"/>
+              <a:t>&lt;</a:t>
+            </a:r>
+            <a:r>
+              <a:rPr lang="en-US" dirty="0" err="1"/>
+              <a:t>ExodusII_IO</a:t>
+            </a:r>
+            <a:r>
+              <a:rPr lang="en-US" dirty="0"/>
+              <a:t>&gt; mesh1_exodus_io(</a:t>
+            </a:r>
+            <a:r>
+              <a:rPr lang="en-US" dirty="0" err="1"/>
+              <a:t>uses_exodus</a:t>
+            </a:r>
+            <a:r>
+              <a:rPr lang="en-US" dirty="0"/>
+              <a:t> ? new </a:t>
+            </a:r>
+            <a:r>
+              <a:rPr lang="en-US" dirty="0" err="1"/>
+              <a:t>ExodusII_IO</a:t>
+            </a:r>
+            <a:r>
+              <a:rPr lang="en-US" dirty="0"/>
+              <a:t>(mesh1) : NULL);    </a:t>
+            </a:r>
+          </a:p>
+          <a:p>
+            <a:r>
+              <a:rPr lang="en-US" dirty="0" err="1"/>
+              <a:t>AutoPtr</a:t>
+            </a:r>
+            <a:r>
+              <a:rPr lang="en-US" dirty="0"/>
+              <a:t>&lt;</a:t>
+            </a:r>
+            <a:r>
+              <a:rPr lang="en-US" dirty="0" err="1"/>
+              <a:t>ExodusII_IO</a:t>
+            </a:r>
+            <a:r>
+              <a:rPr lang="en-US" dirty="0"/>
+              <a:t>&gt; mesh2_exodus_io(</a:t>
+            </a:r>
+            <a:r>
+              <a:rPr lang="en-US" dirty="0" err="1"/>
+              <a:t>uses_exodus</a:t>
+            </a:r>
+            <a:r>
+              <a:rPr lang="en-US" dirty="0"/>
+              <a:t> ? new </a:t>
+            </a:r>
+            <a:r>
+              <a:rPr lang="en-US" dirty="0" err="1"/>
+              <a:t>ExodusII_IO</a:t>
+            </a:r>
+            <a:r>
+              <a:rPr lang="en-US" dirty="0"/>
+              <a:t>(mesh2) : NULL);	</a:t>
+            </a:r>
+          </a:p>
+          <a:p>
+            <a:endParaRPr lang="en-US" dirty="0"/>
+          </a:p>
+          <a:p>
+            <a:r>
+              <a:rPr lang="en-US" dirty="0">
+                <a:solidFill>
+                  <a:srgbClr val="FF0000"/>
+                </a:solidFill>
+              </a:rPr>
+              <a:t>Should be changed to these </a:t>
+            </a:r>
+            <a:r>
+              <a:rPr lang="en-US" dirty="0" smtClean="0">
+                <a:solidFill>
+                  <a:srgbClr val="FF0000"/>
+                </a:solidFill>
+              </a:rPr>
+              <a:t>lines</a:t>
+            </a:r>
+            <a:endParaRPr lang="en-US" dirty="0"/>
+          </a:p>
+          <a:p>
+            <a:r>
+              <a:rPr lang="en-US" dirty="0" err="1" smtClean="0"/>
+              <a:t>std</a:t>
+            </a:r>
+            <a:r>
+              <a:rPr lang="en-US" dirty="0"/>
+              <a:t>::</a:t>
+            </a:r>
+            <a:r>
+              <a:rPr lang="en-US" dirty="0" err="1"/>
+              <a:t>unique_ptr</a:t>
+            </a:r>
+            <a:r>
+              <a:rPr lang="en-US" dirty="0"/>
+              <a:t>&lt;</a:t>
+            </a:r>
+            <a:r>
+              <a:rPr lang="en-US" dirty="0" err="1"/>
+              <a:t>ExodusII_IO</a:t>
+            </a:r>
+            <a:r>
+              <a:rPr lang="en-US" dirty="0"/>
+              <a:t>&gt; mesh1_exodus_io(</a:t>
+            </a:r>
+            <a:r>
+              <a:rPr lang="en-US" dirty="0" err="1"/>
+              <a:t>uses_exodus</a:t>
+            </a:r>
+            <a:r>
+              <a:rPr lang="en-US" dirty="0"/>
+              <a:t> ? new </a:t>
+            </a:r>
+            <a:r>
+              <a:rPr lang="en-US" dirty="0" err="1"/>
+              <a:t>ExodusII_IO</a:t>
+            </a:r>
+            <a:r>
+              <a:rPr lang="en-US" dirty="0"/>
+              <a:t>(mesh1) : NULL</a:t>
+            </a:r>
+            <a:r>
+              <a:rPr lang="en-US" dirty="0" smtClean="0"/>
+              <a:t>);</a:t>
+            </a:r>
+          </a:p>
+          <a:p>
+            <a:r>
+              <a:rPr lang="en-US" dirty="0" err="1" smtClean="0"/>
+              <a:t>std</a:t>
+            </a:r>
+            <a:r>
+              <a:rPr lang="en-US" dirty="0"/>
+              <a:t>::</a:t>
+            </a:r>
+            <a:r>
+              <a:rPr lang="en-US" dirty="0" err="1"/>
+              <a:t>unique_ptr</a:t>
+            </a:r>
+            <a:r>
+              <a:rPr lang="en-US" dirty="0"/>
+              <a:t>&lt;</a:t>
+            </a:r>
+            <a:r>
+              <a:rPr lang="en-US" dirty="0" err="1"/>
+              <a:t>ExodusII_IO</a:t>
+            </a:r>
+            <a:r>
+              <a:rPr lang="en-US" dirty="0"/>
+              <a:t>&gt; mesh2_exodus_io(</a:t>
+            </a:r>
+            <a:r>
+              <a:rPr lang="en-US" dirty="0" err="1"/>
+              <a:t>uses_exodus</a:t>
+            </a:r>
+            <a:r>
+              <a:rPr lang="en-US" dirty="0"/>
+              <a:t> ? new </a:t>
+            </a:r>
+            <a:r>
+              <a:rPr lang="en-US" dirty="0" err="1"/>
+              <a:t>ExodusII_IO</a:t>
+            </a:r>
+            <a:r>
+              <a:rPr lang="en-US" dirty="0"/>
+              <a:t>(mesh2) : NULL);</a:t>
+            </a:r>
+          </a:p>
+        </p:txBody>
+      </p:sp>
+    </p:spTree>
+    <p:extLst>
+      <p:ext uri="{BB962C8B-B14F-4D97-AF65-F5344CB8AC3E}">
+        <p14:creationId xmlns:p14="http://schemas.microsoft.com/office/powerpoint/2010/main" val="1589379641"/>
       </p:ext>
     </p:extLst>
   </p:cSld>
@@ -9661,15 +9851,7 @@
             </a:r>
             <a:r>
               <a:rPr lang="en-US" dirty="0" smtClean="0"/>
-              <a:t> = </a:t>
-            </a:r>
-            <a:r>
-              <a:rPr lang="en-US" dirty="0" smtClean="0"/>
-              <a:t>s(0)*</a:t>
-            </a:r>
-            <a:r>
-              <a:rPr lang="en-US" dirty="0" smtClean="0"/>
-              <a:t>cos(</a:t>
+              <a:t> = s(0)*cos(</a:t>
             </a:r>
             <a:r>
               <a:rPr lang="en-US" dirty="0" err="1" smtClean="0"/>
@@ -9677,15 +9859,7 @@
             </a:r>
             <a:r>
               <a:rPr lang="en-US" dirty="0" smtClean="0"/>
-              <a:t>)+((</a:t>
-            </a:r>
-            <a:r>
-              <a:rPr lang="en-US" dirty="0" smtClean="0"/>
-              <a:t>s(2)+</a:t>
-            </a:r>
-            <a:r>
-              <a:rPr lang="en-US" dirty="0" smtClean="0"/>
-              <a:t>0.5*</a:t>
+              <a:t>)+((s(2)+0.5*</a:t>
             </a:r>
             <a:r>
               <a:rPr lang="en-US" dirty="0" err="1" smtClean="0"/>
@@ -9701,19 +9875,7 @@
             </a:r>
             <a:r>
               <a:rPr lang="en-US" dirty="0" smtClean="0"/>
-              <a:t>)+</a:t>
-            </a:r>
-            <a:r>
-              <a:rPr lang="en-US" dirty="0" smtClean="0"/>
-              <a:t>s(1)</a:t>
-            </a:r>
-            <a:r>
-              <a:rPr lang="en-US" dirty="0" smtClean="0"/>
-              <a:t>)*-</a:t>
-            </a:r>
-            <a:r>
-              <a:rPr lang="en-US" dirty="0" smtClean="0"/>
-              <a:t>sin(</a:t>
+              <a:t>)+s(1))*-sin(</a:t>
             </a:r>
             <a:r>
               <a:rPr lang="en-US" dirty="0" err="1" smtClean="0"/>
@@ -9739,15 +9901,7 @@
             </a:r>
             <a:r>
               <a:rPr lang="en-US" dirty="0" smtClean="0"/>
-              <a:t>1) = ((</a:t>
-            </a:r>
-            <a:r>
-              <a:rPr lang="en-US" dirty="0" smtClean="0"/>
-              <a:t>s(2)+</a:t>
-            </a:r>
-            <a:r>
-              <a:rPr lang="en-US" dirty="0" smtClean="0"/>
-              <a:t>0.5*</a:t>
+              <a:t>1) = ((s(2)+0.5*</a:t>
             </a:r>
             <a:r>
               <a:rPr lang="en-US" dirty="0" err="1" smtClean="0"/>
@@ -9763,11 +9917,7 @@
             </a:r>
             <a:r>
               <a:rPr lang="en-US" dirty="0" smtClean="0"/>
-              <a:t>)+s(1))*</a:t>
-            </a:r>
-            <a:r>
-              <a:rPr lang="en-US" dirty="0" smtClean="0"/>
-              <a:t>cos(</a:t>
+              <a:t>)+s(1))*cos(</a:t>
             </a:r>
             <a:r>
               <a:rPr lang="en-US" dirty="0" err="1" smtClean="0"/>
@@ -9775,15 +9925,7 @@
             </a:r>
             <a:r>
               <a:rPr lang="en-US" dirty="0" smtClean="0"/>
-              <a:t>)+</a:t>
-            </a:r>
-            <a:r>
-              <a:rPr lang="en-US" dirty="0" smtClean="0"/>
-              <a:t>s(0)*</a:t>
-            </a:r>
-            <a:r>
-              <a:rPr lang="en-US" dirty="0" smtClean="0"/>
-              <a:t>sin(</a:t>
+              <a:t>)+s(0)*sin(</a:t>
             </a:r>
             <a:r>
               <a:rPr lang="en-US" dirty="0" err="1" smtClean="0"/>
@@ -9812,15 +9954,7 @@
             </a:r>
             <a:r>
               <a:rPr lang="en-US" dirty="0" smtClean="0"/>
-              <a:t> = </a:t>
-            </a:r>
-            <a:r>
-              <a:rPr lang="en-US" dirty="0" smtClean="0"/>
-              <a:t>s(2)*</a:t>
-            </a:r>
-            <a:r>
-              <a:rPr lang="en-US" dirty="0" smtClean="0"/>
-              <a:t>sin(</a:t>
+              <a:t> = s(2)*sin(</a:t>
             </a:r>
             <a:r>
               <a:rPr lang="en-US" dirty="0" err="1" smtClean="0"/>
@@ -9858,49 +9992,13 @@
           <a:p>
             <a:r>
               <a:rPr lang="en-US" dirty="0" smtClean="0"/>
-              <a:t>Let </a:t>
-            </a:r>
+              <a:t>Let s(2) be position along chord and s(0) be position along span in initial configuration</a:t>
+            </a:r>
+          </a:p>
+          <a:p>
             <a:r>
               <a:rPr lang="en-US" dirty="0" smtClean="0"/>
-              <a:t>s(2) </a:t>
-            </a:r>
-            <a:r>
-              <a:rPr lang="en-US" dirty="0" smtClean="0"/>
-              <a:t>be position along chord and </a:t>
-            </a:r>
-            <a:r>
-              <a:rPr lang="en-US" dirty="0" smtClean="0"/>
-              <a:t>s(0) </a:t>
-            </a:r>
-            <a:r>
-              <a:rPr lang="en-US" dirty="0" smtClean="0"/>
-              <a:t>be position along span in initial configuration</a:t>
-            </a:r>
-          </a:p>
-          <a:p>
-            <a:r>
-              <a:rPr lang="en-US" dirty="0" smtClean="0"/>
-              <a:t>Note </a:t>
-            </a:r>
-            <a:r>
-              <a:rPr lang="en-US" dirty="0" smtClean="0"/>
-              <a:t>s(2)=</a:t>
-            </a:r>
-            <a:r>
-              <a:rPr lang="en-US" dirty="0" smtClean="0"/>
-              <a:t>0 in middle of wing and is along the z-plane, </a:t>
-            </a:r>
-            <a:r>
-              <a:rPr lang="en-US" dirty="0" smtClean="0"/>
-              <a:t>s(0) </a:t>
-            </a:r>
-            <a:r>
-              <a:rPr lang="en-US" dirty="0" smtClean="0"/>
-              <a:t>is along the </a:t>
-            </a:r>
-            <a:r>
-              <a:rPr lang="en-US" dirty="0" smtClean="0"/>
-              <a:t>x-plane</a:t>
+              <a:t>Note s(2)=0 in middle of wing and is along the z-plane, s(0) is along the x-plane</a:t>
             </a:r>
           </a:p>
           <a:p>
@@ -9965,15 +10063,7 @@
             </a:r>
             <a:r>
               <a:rPr lang="en-US" dirty="0" smtClean="0"/>
-              <a:t> = </a:t>
-            </a:r>
-            <a:r>
-              <a:rPr lang="en-US" dirty="0" smtClean="0"/>
-              <a:t>s(0)*</a:t>
-            </a:r>
-            <a:r>
-              <a:rPr lang="en-US" dirty="0" smtClean="0"/>
-              <a:t>cos(</a:t>
+              <a:t> = s(0)*cos(</a:t>
             </a:r>
             <a:r>
               <a:rPr lang="en-US" dirty="0" err="1" smtClean="0"/>
@@ -9981,15 +10071,7 @@
             </a:r>
             <a:r>
               <a:rPr lang="en-US" dirty="0" smtClean="0"/>
-              <a:t>)+(</a:t>
-            </a:r>
-            <a:r>
-              <a:rPr lang="en-US" dirty="0" smtClean="0"/>
-              <a:t>s(2)*</a:t>
-            </a:r>
-            <a:r>
-              <a:rPr lang="en-US" dirty="0" smtClean="0"/>
-              <a:t>cos(</a:t>
+              <a:t>)+(s(2)*cos(</a:t>
             </a:r>
             <a:r>
               <a:rPr lang="en-US" dirty="0" err="1" smtClean="0"/>
@@ -9997,19 +10079,7 @@
             </a:r>
             <a:r>
               <a:rPr lang="en-US" dirty="0" smtClean="0"/>
-              <a:t>)+</a:t>
-            </a:r>
-            <a:r>
-              <a:rPr lang="en-US" dirty="0" smtClean="0"/>
-              <a:t>s(1)</a:t>
-            </a:r>
-            <a:r>
-              <a:rPr lang="en-US" dirty="0" smtClean="0"/>
-              <a:t>)*-</a:t>
-            </a:r>
-            <a:r>
-              <a:rPr lang="en-US" dirty="0" smtClean="0"/>
-              <a:t>sin(</a:t>
+              <a:t>)+s(1))*-sin(</a:t>
             </a:r>
             <a:r>
               <a:rPr lang="en-US" dirty="0" err="1" smtClean="0"/>
@@ -10037,15 +10107,7 @@
             </a:r>
             <a:r>
               <a:rPr lang="en-US" dirty="0" smtClean="0"/>
-              <a:t>1) = (</a:t>
-            </a:r>
-            <a:r>
-              <a:rPr lang="en-US" dirty="0" smtClean="0"/>
-              <a:t>s(2)*</a:t>
-            </a:r>
-            <a:r>
-              <a:rPr lang="en-US" dirty="0" smtClean="0"/>
-              <a:t>cos(</a:t>
+              <a:t>1) = (s(2)*cos(</a:t>
             </a:r>
             <a:r>
               <a:rPr lang="en-US" dirty="0" err="1" smtClean="0"/>
@@ -10053,19 +10115,7 @@
             </a:r>
             <a:r>
               <a:rPr lang="en-US" dirty="0" smtClean="0"/>
-              <a:t>)+</a:t>
-            </a:r>
-            <a:r>
-              <a:rPr lang="en-US" dirty="0" smtClean="0"/>
-              <a:t>s(1)</a:t>
-            </a:r>
-            <a:r>
-              <a:rPr lang="en-US" dirty="0" smtClean="0"/>
-              <a:t>)*</a:t>
-            </a:r>
-            <a:r>
-              <a:rPr lang="en-US" dirty="0" smtClean="0"/>
-              <a:t>cos(</a:t>
+              <a:t>)+s(1))*cos(</a:t>
             </a:r>
             <a:r>
               <a:rPr lang="en-US" dirty="0" err="1" smtClean="0"/>
@@ -10073,15 +10123,7 @@
             </a:r>
             <a:r>
               <a:rPr lang="en-US" dirty="0" smtClean="0"/>
-              <a:t>)+</a:t>
-            </a:r>
-            <a:r>
-              <a:rPr lang="en-US" dirty="0" smtClean="0"/>
-              <a:t>s(0)*</a:t>
-            </a:r>
-            <a:r>
-              <a:rPr lang="en-US" dirty="0" smtClean="0"/>
-              <a:t>sin(</a:t>
+              <a:t>)+s(0)*sin(</a:t>
             </a:r>
             <a:r>
               <a:rPr lang="en-US" dirty="0" err="1" smtClean="0"/>
@@ -10113,15 +10155,7 @@
             </a:r>
             <a:r>
               <a:rPr lang="en-US" dirty="0" smtClean="0"/>
-              <a:t> = </a:t>
-            </a:r>
-            <a:r>
-              <a:rPr lang="en-US" dirty="0" smtClean="0"/>
-              <a:t>s(2)*</a:t>
-            </a:r>
-            <a:r>
-              <a:rPr lang="en-US" dirty="0" smtClean="0"/>
-              <a:t>sin(</a:t>
+              <a:t> = s(2)*sin(</a:t>
             </a:r>
             <a:r>
               <a:rPr lang="en-US" dirty="0" err="1" smtClean="0"/>

</xml_diff>